<commit_message>
set up to train
</commit_message>
<xml_diff>
--- a/COS429FinalProject.pptx
+++ b/COS429FinalProject.pptx
@@ -4261,12 +4261,44 @@
             <p:ph idx="1"/>
           </p:nvPr>
         </p:nvSpPr>
-        <p:spPr/>
-        <p:txBody>
-          <a:bodyPr/>
-          <a:lstStyle/>
-          <a:p>
-            <a:endParaRPr lang="en-US"/>
+        <p:spPr>
+          <a:xfrm>
+            <a:off x="380999" y="4588933"/>
+            <a:ext cx="8407893" cy="1537546"/>
+          </a:xfrm>
+        </p:spPr>
+        <p:txBody>
+          <a:bodyPr>
+            <a:normAutofit/>
+          </a:bodyPr>
+          <a:lstStyle/>
+          <a:p>
+            <a:r>
+              <a:rPr lang="en-US" dirty="0" smtClean="0"/>
+              <a:t>steps: </a:t>
+            </a:r>
+          </a:p>
+          <a:p>
+            <a:pPr lvl="1"/>
+            <a:r>
+              <a:rPr lang="en-US" dirty="0" smtClean="0"/>
+              <a:t>flip across vertical axis</a:t>
+            </a:r>
+          </a:p>
+          <a:p>
+            <a:pPr lvl="1"/>
+            <a:r>
+              <a:rPr lang="en-US" dirty="0" smtClean="0"/>
+              <a:t>find strong borders</a:t>
+            </a:r>
+          </a:p>
+          <a:p>
+            <a:pPr lvl="1"/>
+            <a:r>
+              <a:rPr lang="en-US" dirty="0" smtClean="0"/>
+              <a:t>crop (with buffer)</a:t>
+            </a:r>
+            <a:endParaRPr lang="en-US" dirty="0"/>
           </a:p>
         </p:txBody>
       </p:sp>
@@ -4293,6 +4325,96 @@
           </a:p>
         </p:txBody>
       </p:sp>
+      <p:pic>
+        <p:nvPicPr>
+          <p:cNvPr id="5" name="Picture 4" descr="webcam.jpg"/>
+          <p:cNvPicPr>
+            <a:picLocks noChangeAspect="1"/>
+          </p:cNvPicPr>
+          <p:nvPr/>
+        </p:nvPicPr>
+        <p:blipFill>
+          <a:blip r:embed="rId2">
+            <a:extLst>
+              <a:ext uri="{28A0092B-C50C-407E-A947-70E740481C1C}">
+                <a14:useLocalDpi xmlns:a14="http://schemas.microsoft.com/office/drawing/2010/main" val="0"/>
+              </a:ext>
+            </a:extLst>
+          </a:blip>
+          <a:stretch>
+            <a:fillRect/>
+          </a:stretch>
+        </p:blipFill>
+        <p:spPr>
+          <a:xfrm>
+            <a:off x="381000" y="2341324"/>
+            <a:ext cx="2396067" cy="1797051"/>
+          </a:xfrm>
+          <a:prstGeom prst="rect">
+            <a:avLst/>
+          </a:prstGeom>
+        </p:spPr>
+      </p:pic>
+      <p:pic>
+        <p:nvPicPr>
+          <p:cNvPr id="6" name="Picture 5" descr="webcam_getpicture_precrop.jpg"/>
+          <p:cNvPicPr>
+            <a:picLocks noChangeAspect="1"/>
+          </p:cNvPicPr>
+          <p:nvPr/>
+        </p:nvPicPr>
+        <p:blipFill>
+          <a:blip r:embed="rId3">
+            <a:extLst>
+              <a:ext uri="{28A0092B-C50C-407E-A947-70E740481C1C}">
+                <a14:useLocalDpi xmlns:a14="http://schemas.microsoft.com/office/drawing/2010/main" val="0"/>
+              </a:ext>
+            </a:extLst>
+          </a:blip>
+          <a:stretch>
+            <a:fillRect/>
+          </a:stretch>
+        </p:blipFill>
+        <p:spPr>
+          <a:xfrm>
+            <a:off x="3306223" y="2341324"/>
+            <a:ext cx="2366442" cy="1774832"/>
+          </a:xfrm>
+          <a:prstGeom prst="rect">
+            <a:avLst/>
+          </a:prstGeom>
+        </p:spPr>
+      </p:pic>
+      <p:pic>
+        <p:nvPicPr>
+          <p:cNvPr id="7" name="Picture 6" descr="webcam_getpicture_cropped.jpg"/>
+          <p:cNvPicPr>
+            <a:picLocks noChangeAspect="1"/>
+          </p:cNvPicPr>
+          <p:nvPr/>
+        </p:nvPicPr>
+        <p:blipFill>
+          <a:blip r:embed="rId4">
+            <a:extLst>
+              <a:ext uri="{28A0092B-C50C-407E-A947-70E740481C1C}">
+                <a14:useLocalDpi xmlns:a14="http://schemas.microsoft.com/office/drawing/2010/main" val="0"/>
+              </a:ext>
+            </a:extLst>
+          </a:blip>
+          <a:stretch>
+            <a:fillRect/>
+          </a:stretch>
+        </p:blipFill>
+        <p:spPr>
+          <a:xfrm>
+            <a:off x="6166471" y="2341324"/>
+            <a:ext cx="2595789" cy="1774832"/>
+          </a:xfrm>
+          <a:prstGeom prst="rect">
+            <a:avLst/>
+          </a:prstGeom>
+        </p:spPr>
+      </p:pic>
     </p:spTree>
     <p:extLst>
       <p:ext uri="{BB962C8B-B14F-4D97-AF65-F5344CB8AC3E}">
@@ -4325,25 +4447,6 @@
       </p:grpSpPr>
       <p:sp>
         <p:nvSpPr>
-          <p:cNvPr id="2" name="Content Placeholder 1"/>
-          <p:cNvSpPr>
-            <a:spLocks noGrp="1"/>
-          </p:cNvSpPr>
-          <p:nvPr>
-            <p:ph idx="1"/>
-          </p:nvPr>
-        </p:nvSpPr>
-        <p:spPr/>
-        <p:txBody>
-          <a:bodyPr/>
-          <a:lstStyle/>
-          <a:p>
-            <a:endParaRPr lang="en-US"/>
-          </a:p>
-        </p:txBody>
-      </p:sp>
-      <p:sp>
-        <p:nvSpPr>
           <p:cNvPr id="3" name="Title 2"/>
           <p:cNvSpPr>
             <a:spLocks noGrp="1"/>
@@ -4364,6 +4467,50 @@
             <a:r>
               <a:rPr lang="en-US" dirty="0" err="1" smtClean="0"/>
               <a:t>SKew</a:t>
+            </a:r>
+            <a:endParaRPr lang="en-US" dirty="0"/>
+          </a:p>
+        </p:txBody>
+      </p:sp>
+      <p:sp>
+        <p:nvSpPr>
+          <p:cNvPr id="5" name="Content Placeholder 1"/>
+          <p:cNvSpPr>
+            <a:spLocks noGrp="1"/>
+          </p:cNvSpPr>
+          <p:nvPr>
+            <p:ph idx="1"/>
+          </p:nvPr>
+        </p:nvSpPr>
+        <p:spPr>
+          <a:xfrm>
+            <a:off x="380999" y="4588933"/>
+            <a:ext cx="8407893" cy="1537546"/>
+          </a:xfrm>
+        </p:spPr>
+        <p:txBody>
+          <a:bodyPr>
+            <a:normAutofit/>
+          </a:bodyPr>
+          <a:lstStyle/>
+          <a:p>
+            <a:r>
+              <a:rPr lang="en-US" dirty="0" smtClean="0"/>
+              <a:t>steps: </a:t>
+            </a:r>
+          </a:p>
+          <a:p>
+            <a:pPr lvl="1"/>
+            <a:r>
+              <a:rPr lang="en-US" dirty="0"/>
+              <a:t>for each “black” pixel, vote for lines</a:t>
+            </a:r>
+          </a:p>
+          <a:p>
+            <a:pPr lvl="1"/>
+            <a:r>
+              <a:rPr lang="en-US" dirty="0"/>
+              <a:t>pick most voted and rotate accordingly</a:t>
             </a:r>
             <a:endParaRPr lang="en-US" dirty="0"/>
           </a:p>

</xml_diff>

<commit_message>
intermediate folder + presentation
</commit_message>
<xml_diff>
--- a/COS429FinalProject.pptx
+++ b/COS429FinalProject.pptx
@@ -3938,25 +3938,6 @@
       </p:grpSpPr>
       <p:sp>
         <p:nvSpPr>
-          <p:cNvPr id="2" name="Content Placeholder 1"/>
-          <p:cNvSpPr>
-            <a:spLocks noGrp="1"/>
-          </p:cNvSpPr>
-          <p:nvPr>
-            <p:ph idx="1"/>
-          </p:nvPr>
-        </p:nvSpPr>
-        <p:spPr/>
-        <p:txBody>
-          <a:bodyPr/>
-          <a:lstStyle/>
-          <a:p>
-            <a:endParaRPr lang="en-US"/>
-          </a:p>
-        </p:txBody>
-      </p:sp>
-      <p:sp>
-        <p:nvSpPr>
           <p:cNvPr id="3" name="Title 2"/>
           <p:cNvSpPr>
             <a:spLocks noGrp="1"/>
@@ -3975,6 +3956,155 @@
               <a:t>Display Puzzle</a:t>
             </a:r>
             <a:endParaRPr lang="en-US" dirty="0"/>
+          </a:p>
+        </p:txBody>
+      </p:sp>
+      <p:sp>
+        <p:nvSpPr>
+          <p:cNvPr id="4" name="Content Placeholder 1"/>
+          <p:cNvSpPr>
+            <a:spLocks noGrp="1"/>
+          </p:cNvSpPr>
+          <p:nvPr>
+            <p:ph idx="1"/>
+          </p:nvPr>
+        </p:nvSpPr>
+        <p:spPr>
+          <a:xfrm>
+            <a:off x="380999" y="4814709"/>
+            <a:ext cx="8407893" cy="1537546"/>
+          </a:xfrm>
+        </p:spPr>
+        <p:txBody>
+          <a:bodyPr>
+            <a:normAutofit/>
+          </a:bodyPr>
+          <a:lstStyle/>
+          <a:p>
+            <a:r>
+              <a:rPr lang="en-US" dirty="0" smtClean="0"/>
+              <a:t>steps: </a:t>
+            </a:r>
+          </a:p>
+          <a:p>
+            <a:pPr lvl="1"/>
+            <a:r>
+              <a:rPr lang="en-US" dirty="0" smtClean="0"/>
+              <a:t>takes in 2D </a:t>
+            </a:r>
+            <a:r>
+              <a:rPr lang="en-US" dirty="0" err="1" smtClean="0"/>
+              <a:t>boolean</a:t>
+            </a:r>
+            <a:r>
+              <a:rPr lang="en-US" dirty="0" smtClean="0"/>
+              <a:t> solution array</a:t>
+            </a:r>
+          </a:p>
+          <a:p>
+            <a:pPr lvl="1"/>
+            <a:r>
+              <a:rPr lang="en-US" dirty="0" smtClean="0"/>
+              <a:t>make a new image, setting pixels as black or white according to the provided array</a:t>
+            </a:r>
+            <a:endParaRPr lang="en-US" dirty="0"/>
+          </a:p>
+        </p:txBody>
+      </p:sp>
+      <p:sp>
+        <p:nvSpPr>
+          <p:cNvPr id="5" name="TextBox 4"/>
+          <p:cNvSpPr txBox="1"/>
+          <p:nvPr/>
+        </p:nvSpPr>
+        <p:spPr>
+          <a:xfrm>
+            <a:off x="818444" y="2159000"/>
+            <a:ext cx="2370667" cy="2031325"/>
+          </a:xfrm>
+          <a:prstGeom prst="rect">
+            <a:avLst/>
+          </a:prstGeom>
+          <a:noFill/>
+        </p:spPr>
+        <p:txBody>
+          <a:bodyPr wrap="square" rtlCol="0">
+            <a:spAutoFit/>
+          </a:bodyPr>
+          <a:lstStyle/>
+          <a:p>
+            <a:r>
+              <a:rPr lang="en-US" dirty="0" smtClean="0"/>
+              <a:t>[</a:t>
+            </a:r>
+            <a:r>
+              <a:rPr lang="en-US" dirty="0"/>
+              <a:t>[0, 0, 0, 0, 0, 0, 0, 0],</a:t>
+            </a:r>
+          </a:p>
+          <a:p>
+            <a:r>
+              <a:rPr lang="en-US" dirty="0" smtClean="0"/>
+              <a:t> [0, 0, 0, 0, 0, 0, 0, 0],</a:t>
+            </a:r>
+          </a:p>
+          <a:p>
+            <a:r>
+              <a:rPr lang="en-US" dirty="0" smtClean="0"/>
+              <a:t> [</a:t>
+            </a:r>
+            <a:r>
+              <a:rPr lang="en-US" dirty="0"/>
+              <a:t>0, 0, 0, 0, 0, 0, 0, 0],</a:t>
+            </a:r>
+          </a:p>
+          <a:p>
+            <a:r>
+              <a:rPr lang="en-US" dirty="0" smtClean="0"/>
+              <a:t> </a:t>
+            </a:r>
+            <a:r>
+              <a:rPr lang="en-US" dirty="0"/>
+              <a:t>[0, 0, 0, 0, 0, 0, 0, 0],</a:t>
+            </a:r>
+          </a:p>
+          <a:p>
+            <a:r>
+              <a:rPr lang="en-US" dirty="0" smtClean="0"/>
+              <a:t> </a:t>
+            </a:r>
+            <a:r>
+              <a:rPr lang="en-US" dirty="0"/>
+              <a:t>[0, 0, 0, 0, 0, 0, 0, 0],</a:t>
+            </a:r>
+          </a:p>
+          <a:p>
+            <a:r>
+              <a:rPr lang="en-US" dirty="0" smtClean="0"/>
+              <a:t> </a:t>
+            </a:r>
+            <a:r>
+              <a:rPr lang="en-US" dirty="0"/>
+              <a:t>[0, 0, 0, 0, 0, 0, 0, 0],</a:t>
+            </a:r>
+          </a:p>
+          <a:p>
+            <a:r>
+              <a:rPr lang="en-US" dirty="0" smtClean="0"/>
+              <a:t> </a:t>
+            </a:r>
+            <a:r>
+              <a:rPr lang="en-US" dirty="0"/>
+              <a:t>[0, 0, 0, 0, 0, 0, 0, 0</a:t>
+            </a:r>
+            <a:r>
+              <a:rPr lang="en-US" dirty="0" smtClean="0"/>
+              <a:t>]</a:t>
+            </a:r>
+            <a:r>
+              <a:rPr lang="en-US" dirty="0"/>
+              <a:t>]</a:t>
+            </a:r>
           </a:p>
         </p:txBody>
       </p:sp>
@@ -4010,12 +4140,12 @@
       </p:grpSpPr>
       <p:sp>
         <p:nvSpPr>
-          <p:cNvPr id="2" name="Content Placeholder 1"/>
-          <p:cNvSpPr>
-            <a:spLocks noGrp="1"/>
-          </p:cNvSpPr>
-          <p:nvPr>
-            <p:ph idx="1"/>
+          <p:cNvPr id="3" name="Title 2"/>
+          <p:cNvSpPr>
+            <a:spLocks noGrp="1"/>
+          </p:cNvSpPr>
+          <p:nvPr>
+            <p:ph type="title"/>
           </p:nvPr>
         </p:nvSpPr>
         <p:spPr/>
@@ -4023,33 +4153,44 @@
           <a:bodyPr/>
           <a:lstStyle/>
           <a:p>
-            <a:endParaRPr lang="en-US"/>
-          </a:p>
-        </p:txBody>
-      </p:sp>
-      <p:sp>
-        <p:nvSpPr>
-          <p:cNvPr id="3" name="Title 2"/>
-          <p:cNvSpPr>
-            <a:spLocks noGrp="1"/>
-          </p:cNvSpPr>
-          <p:nvPr>
-            <p:ph type="title"/>
-          </p:nvPr>
-        </p:nvSpPr>
-        <p:spPr/>
-        <p:txBody>
-          <a:bodyPr/>
-          <a:lstStyle/>
-          <a:p>
             <a:r>
               <a:rPr lang="en-US" dirty="0" err="1" smtClean="0"/>
-              <a:t>MOtivation</a:t>
+              <a:t>Nonograms</a:t>
             </a:r>
             <a:endParaRPr lang="en-US" dirty="0"/>
           </a:p>
         </p:txBody>
       </p:sp>
+      <p:pic>
+        <p:nvPicPr>
+          <p:cNvPr id="4" name="Picture 3" descr="blue8.jpg"/>
+          <p:cNvPicPr>
+            <a:picLocks noChangeAspect="1"/>
+          </p:cNvPicPr>
+          <p:nvPr/>
+        </p:nvPicPr>
+        <p:blipFill>
+          <a:blip r:embed="rId2">
+            <a:extLst>
+              <a:ext uri="{28A0092B-C50C-407E-A947-70E740481C1C}">
+                <a14:useLocalDpi xmlns:a14="http://schemas.microsoft.com/office/drawing/2010/main" val="0"/>
+              </a:ext>
+            </a:extLst>
+          </a:blip>
+          <a:stretch>
+            <a:fillRect/>
+          </a:stretch>
+        </p:blipFill>
+        <p:spPr>
+          <a:xfrm>
+            <a:off x="2219324" y="2118274"/>
+            <a:ext cx="4723555" cy="4147058"/>
+          </a:xfrm>
+          <a:prstGeom prst="rect">
+            <a:avLst/>
+          </a:prstGeom>
+        </p:spPr>
+      </p:pic>
     </p:spTree>
     <p:extLst>
       <p:ext uri="{BB962C8B-B14F-4D97-AF65-F5344CB8AC3E}">
@@ -4090,9 +4231,16 @@
             <p:ph idx="1"/>
           </p:nvPr>
         </p:nvSpPr>
-        <p:spPr/>
-        <p:txBody>
-          <a:bodyPr/>
+        <p:spPr>
+          <a:xfrm>
+            <a:off x="380999" y="1719070"/>
+            <a:ext cx="8407893" cy="4955485"/>
+          </a:xfrm>
+        </p:spPr>
+        <p:txBody>
+          <a:bodyPr>
+            <a:normAutofit/>
+          </a:bodyPr>
           <a:lstStyle/>
           <a:p>
             <a:r>
@@ -4180,6 +4328,12 @@
           </a:p>
           <a:p>
             <a:endParaRPr lang="en-US" dirty="0"/>
+          </a:p>
+          <a:p>
+            <a:pPr marL="45720" indent="0">
+              <a:buNone/>
+            </a:pPr>
+            <a:endParaRPr lang="en-US" dirty="0" smtClean="0"/>
           </a:p>
           <a:p>
             <a:pPr marL="45720" indent="0">
@@ -4263,7 +4417,7 @@
         </p:nvSpPr>
         <p:spPr>
           <a:xfrm>
-            <a:off x="380999" y="4588933"/>
+            <a:off x="380999" y="4814709"/>
             <a:ext cx="8407893" cy="1537546"/>
           </a:xfrm>
         </p:spPr>
@@ -4289,7 +4443,7 @@
             <a:pPr lvl="1"/>
             <a:r>
               <a:rPr lang="en-US" dirty="0" smtClean="0"/>
-              <a:t>find strong borders</a:t>
+              <a:t>find strong borders using neighborhood voting system</a:t>
             </a:r>
           </a:p>
           <a:p>
@@ -4347,8 +4501,8 @@
         </p:blipFill>
         <p:spPr>
           <a:xfrm>
-            <a:off x="381000" y="2341324"/>
-            <a:ext cx="2396067" cy="1797051"/>
+            <a:off x="381000" y="2201334"/>
+            <a:ext cx="2582722" cy="1937042"/>
           </a:xfrm>
           <a:prstGeom prst="rect">
             <a:avLst/>
@@ -4377,8 +4531,8 @@
         </p:blipFill>
         <p:spPr>
           <a:xfrm>
-            <a:off x="3306223" y="2341324"/>
-            <a:ext cx="2366442" cy="1774832"/>
+            <a:off x="3179223" y="2201334"/>
+            <a:ext cx="2553095" cy="1914822"/>
           </a:xfrm>
           <a:prstGeom prst="rect">
             <a:avLst/>
@@ -4407,8 +4561,8 @@
         </p:blipFill>
         <p:spPr>
           <a:xfrm>
-            <a:off x="6166471" y="2341324"/>
-            <a:ext cx="2595789" cy="1774832"/>
+            <a:off x="5961729" y="2201334"/>
+            <a:ext cx="2800532" cy="1914822"/>
           </a:xfrm>
           <a:prstGeom prst="rect">
             <a:avLst/>
@@ -4484,7 +4638,7 @@
         </p:nvSpPr>
         <p:spPr>
           <a:xfrm>
-            <a:off x="380999" y="4588933"/>
+            <a:off x="380999" y="4814709"/>
             <a:ext cx="8407893" cy="1537546"/>
           </a:xfrm>
         </p:spPr>
@@ -4516,6 +4670,96 @@
           </a:p>
         </p:txBody>
       </p:sp>
+      <p:pic>
+        <p:nvPicPr>
+          <p:cNvPr id="9" name="Picture 8" descr="blue_9_crop_getpicture_line.jpg"/>
+          <p:cNvPicPr>
+            <a:picLocks noChangeAspect="1"/>
+          </p:cNvPicPr>
+          <p:nvPr/>
+        </p:nvPicPr>
+        <p:blipFill>
+          <a:blip r:embed="rId2">
+            <a:extLst>
+              <a:ext uri="{28A0092B-C50C-407E-A947-70E740481C1C}">
+                <a14:useLocalDpi xmlns:a14="http://schemas.microsoft.com/office/drawing/2010/main" val="0"/>
+              </a:ext>
+            </a:extLst>
+          </a:blip>
+          <a:stretch>
+            <a:fillRect/>
+          </a:stretch>
+        </p:blipFill>
+        <p:spPr>
+          <a:xfrm>
+            <a:off x="3344334" y="2061633"/>
+            <a:ext cx="2626284" cy="2133186"/>
+          </a:xfrm>
+          <a:prstGeom prst="rect">
+            <a:avLst/>
+          </a:prstGeom>
+        </p:spPr>
+      </p:pic>
+      <p:pic>
+        <p:nvPicPr>
+          <p:cNvPr id="10" name="Picture 9" descr="blue_9_crop_antiskewed.jpg"/>
+          <p:cNvPicPr>
+            <a:picLocks noChangeAspect="1"/>
+          </p:cNvPicPr>
+          <p:nvPr/>
+        </p:nvPicPr>
+        <p:blipFill>
+          <a:blip r:embed="rId3">
+            <a:extLst>
+              <a:ext uri="{28A0092B-C50C-407E-A947-70E740481C1C}">
+                <a14:useLocalDpi xmlns:a14="http://schemas.microsoft.com/office/drawing/2010/main" val="0"/>
+              </a:ext>
+            </a:extLst>
+          </a:blip>
+          <a:stretch>
+            <a:fillRect/>
+          </a:stretch>
+        </p:blipFill>
+        <p:spPr>
+          <a:xfrm>
+            <a:off x="6297110" y="2061633"/>
+            <a:ext cx="2491782" cy="2133186"/>
+          </a:xfrm>
+          <a:prstGeom prst="rect">
+            <a:avLst/>
+          </a:prstGeom>
+        </p:spPr>
+      </p:pic>
+      <p:pic>
+        <p:nvPicPr>
+          <p:cNvPr id="11" name="Picture 10" descr="blue_9_crop.jpg"/>
+          <p:cNvPicPr>
+            <a:picLocks noChangeAspect="1"/>
+          </p:cNvPicPr>
+          <p:nvPr/>
+        </p:nvPicPr>
+        <p:blipFill>
+          <a:blip r:embed="rId4">
+            <a:extLst>
+              <a:ext uri="{28A0092B-C50C-407E-A947-70E740481C1C}">
+                <a14:useLocalDpi xmlns:a14="http://schemas.microsoft.com/office/drawing/2010/main" val="0"/>
+              </a:ext>
+            </a:extLst>
+          </a:blip>
+          <a:stretch>
+            <a:fillRect/>
+          </a:stretch>
+        </p:blipFill>
+        <p:spPr>
+          <a:xfrm>
+            <a:off x="380999" y="2061633"/>
+            <a:ext cx="2626284" cy="2133186"/>
+          </a:xfrm>
+          <a:prstGeom prst="rect">
+            <a:avLst/>
+          </a:prstGeom>
+        </p:spPr>
+      </p:pic>
     </p:spTree>
     <p:extLst>
       <p:ext uri="{BB962C8B-B14F-4D97-AF65-F5344CB8AC3E}">
@@ -4548,25 +4792,6 @@
       </p:grpSpPr>
       <p:sp>
         <p:nvSpPr>
-          <p:cNvPr id="2" name="Content Placeholder 1"/>
-          <p:cNvSpPr>
-            <a:spLocks noGrp="1"/>
-          </p:cNvSpPr>
-          <p:nvPr>
-            <p:ph idx="1"/>
-          </p:nvPr>
-        </p:nvSpPr>
-        <p:spPr/>
-        <p:txBody>
-          <a:bodyPr/>
-          <a:lstStyle/>
-          <a:p>
-            <a:endParaRPr lang="en-US"/>
-          </a:p>
-        </p:txBody>
-      </p:sp>
-      <p:sp>
-        <p:nvSpPr>
           <p:cNvPr id="3" name="Title 2"/>
           <p:cNvSpPr>
             <a:spLocks noGrp="1"/>
@@ -4588,6 +4813,180 @@
           </a:p>
         </p:txBody>
       </p:sp>
+      <p:sp>
+        <p:nvSpPr>
+          <p:cNvPr id="4" name="Content Placeholder 1"/>
+          <p:cNvSpPr>
+            <a:spLocks noGrp="1"/>
+          </p:cNvSpPr>
+          <p:nvPr>
+            <p:ph idx="1"/>
+          </p:nvPr>
+        </p:nvSpPr>
+        <p:spPr>
+          <a:xfrm>
+            <a:off x="380999" y="4814709"/>
+            <a:ext cx="8407893" cy="1537546"/>
+          </a:xfrm>
+        </p:spPr>
+        <p:txBody>
+          <a:bodyPr>
+            <a:normAutofit/>
+          </a:bodyPr>
+          <a:lstStyle/>
+          <a:p>
+            <a:r>
+              <a:rPr lang="en-US" dirty="0" smtClean="0"/>
+              <a:t>steps: </a:t>
+            </a:r>
+          </a:p>
+          <a:p>
+            <a:pPr lvl="1"/>
+            <a:r>
+              <a:rPr lang="en-US" dirty="0" smtClean="0"/>
+              <a:t>run horizontal and vertical filters to detect lines</a:t>
+            </a:r>
+          </a:p>
+          <a:p>
+            <a:pPr lvl="1"/>
+            <a:r>
+              <a:rPr lang="en-US" dirty="0" smtClean="0"/>
+              <a:t>look for and vote on line candidates in each</a:t>
+            </a:r>
+          </a:p>
+          <a:p>
+            <a:pPr lvl="1"/>
+            <a:r>
+              <a:rPr lang="en-US" dirty="0" smtClean="0"/>
+              <a:t>heuristics for even spacing and removing outliers</a:t>
+            </a:r>
+          </a:p>
+          <a:p>
+            <a:pPr lvl="1"/>
+            <a:endParaRPr lang="en-US" dirty="0" smtClean="0"/>
+          </a:p>
+        </p:txBody>
+      </p:sp>
+      <p:pic>
+        <p:nvPicPr>
+          <p:cNvPr id="5" name="Picture 4" descr="blue4.jpg"/>
+          <p:cNvPicPr>
+            <a:picLocks noChangeAspect="1"/>
+          </p:cNvPicPr>
+          <p:nvPr/>
+        </p:nvPicPr>
+        <p:blipFill>
+          <a:blip r:embed="rId2">
+            <a:extLst>
+              <a:ext uri="{28A0092B-C50C-407E-A947-70E740481C1C}">
+                <a14:useLocalDpi xmlns:a14="http://schemas.microsoft.com/office/drawing/2010/main" val="0"/>
+              </a:ext>
+            </a:extLst>
+          </a:blip>
+          <a:stretch>
+            <a:fillRect/>
+          </a:stretch>
+        </p:blipFill>
+        <p:spPr>
+          <a:xfrm>
+            <a:off x="381000" y="2197806"/>
+            <a:ext cx="2438400" cy="2095500"/>
+          </a:xfrm>
+          <a:prstGeom prst="rect">
+            <a:avLst/>
+          </a:prstGeom>
+        </p:spPr>
+      </p:pic>
+      <p:pic>
+        <p:nvPicPr>
+          <p:cNvPr id="6" name="Picture 5" descr="painted_lines_both_test.jpg"/>
+          <p:cNvPicPr>
+            <a:picLocks noChangeAspect="1"/>
+          </p:cNvPicPr>
+          <p:nvPr/>
+        </p:nvPicPr>
+        <p:blipFill>
+          <a:blip r:embed="rId3">
+            <a:extLst>
+              <a:ext uri="{28A0092B-C50C-407E-A947-70E740481C1C}">
+                <a14:useLocalDpi xmlns:a14="http://schemas.microsoft.com/office/drawing/2010/main" val="0"/>
+              </a:ext>
+            </a:extLst>
+          </a:blip>
+          <a:stretch>
+            <a:fillRect/>
+          </a:stretch>
+        </p:blipFill>
+        <p:spPr>
+          <a:xfrm>
+            <a:off x="5998812" y="2058872"/>
+            <a:ext cx="2763448" cy="2374838"/>
+          </a:xfrm>
+          <a:prstGeom prst="rect">
+            <a:avLst/>
+          </a:prstGeom>
+        </p:spPr>
+      </p:pic>
+      <p:pic>
+        <p:nvPicPr>
+          <p:cNvPr id="7" name="Picture 6" descr="painted_lines_hor_test.jpg"/>
+          <p:cNvPicPr>
+            <a:picLocks noChangeAspect="1"/>
+          </p:cNvPicPr>
+          <p:nvPr/>
+        </p:nvPicPr>
+        <p:blipFill>
+          <a:blip r:embed="rId4">
+            <a:extLst>
+              <a:ext uri="{28A0092B-C50C-407E-A947-70E740481C1C}">
+                <a14:useLocalDpi xmlns:a14="http://schemas.microsoft.com/office/drawing/2010/main" val="0"/>
+              </a:ext>
+            </a:extLst>
+          </a:blip>
+          <a:stretch>
+            <a:fillRect/>
+          </a:stretch>
+        </p:blipFill>
+        <p:spPr>
+          <a:xfrm>
+            <a:off x="3475950" y="1807542"/>
+            <a:ext cx="1858049" cy="1596761"/>
+          </a:xfrm>
+          <a:prstGeom prst="rect">
+            <a:avLst/>
+          </a:prstGeom>
+        </p:spPr>
+      </p:pic>
+      <p:pic>
+        <p:nvPicPr>
+          <p:cNvPr id="8" name="Picture 7" descr="painted_lines_vert_test.jpg"/>
+          <p:cNvPicPr>
+            <a:picLocks noChangeAspect="1"/>
+          </p:cNvPicPr>
+          <p:nvPr/>
+        </p:nvPicPr>
+        <p:blipFill>
+          <a:blip r:embed="rId5">
+            <a:extLst>
+              <a:ext uri="{28A0092B-C50C-407E-A947-70E740481C1C}">
+                <a14:useLocalDpi xmlns:a14="http://schemas.microsoft.com/office/drawing/2010/main" val="0"/>
+              </a:ext>
+            </a:extLst>
+          </a:blip>
+          <a:stretch>
+            <a:fillRect/>
+          </a:stretch>
+        </p:blipFill>
+        <p:spPr>
+          <a:xfrm>
+            <a:off x="3475950" y="3460749"/>
+            <a:ext cx="1858049" cy="1596761"/>
+          </a:xfrm>
+          <a:prstGeom prst="rect">
+            <a:avLst/>
+          </a:prstGeom>
+        </p:spPr>
+      </p:pic>
     </p:spTree>
     <p:extLst>
       <p:ext uri="{BB962C8B-B14F-4D97-AF65-F5344CB8AC3E}">
@@ -4620,25 +5019,6 @@
       </p:grpSpPr>
       <p:sp>
         <p:nvSpPr>
-          <p:cNvPr id="2" name="Content Placeholder 1"/>
-          <p:cNvSpPr>
-            <a:spLocks noGrp="1"/>
-          </p:cNvSpPr>
-          <p:nvPr>
-            <p:ph idx="1"/>
-          </p:nvPr>
-        </p:nvSpPr>
-        <p:spPr/>
-        <p:txBody>
-          <a:bodyPr/>
-          <a:lstStyle/>
-          <a:p>
-            <a:endParaRPr lang="en-US"/>
-          </a:p>
-        </p:txBody>
-      </p:sp>
-      <p:sp>
-        <p:nvSpPr>
           <p:cNvPr id="3" name="Title 2"/>
           <p:cNvSpPr>
             <a:spLocks noGrp="1"/>
@@ -4660,6 +5040,110 @@
           </a:p>
         </p:txBody>
       </p:sp>
+      <p:sp>
+        <p:nvSpPr>
+          <p:cNvPr id="4" name="Content Placeholder 1"/>
+          <p:cNvSpPr>
+            <a:spLocks noGrp="1"/>
+          </p:cNvSpPr>
+          <p:nvPr>
+            <p:ph idx="1"/>
+          </p:nvPr>
+        </p:nvSpPr>
+        <p:spPr>
+          <a:xfrm>
+            <a:off x="380999" y="4814709"/>
+            <a:ext cx="8407893" cy="1537546"/>
+          </a:xfrm>
+        </p:spPr>
+        <p:txBody>
+          <a:bodyPr>
+            <a:normAutofit/>
+          </a:bodyPr>
+          <a:lstStyle/>
+          <a:p>
+            <a:r>
+              <a:rPr lang="en-US" dirty="0" smtClean="0"/>
+              <a:t>steps: </a:t>
+            </a:r>
+          </a:p>
+          <a:p>
+            <a:pPr lvl="1"/>
+            <a:r>
+              <a:rPr lang="en-US" dirty="0" smtClean="0"/>
+              <a:t>for each possible grid cell, find average intensity and variance</a:t>
+            </a:r>
+          </a:p>
+          <a:p>
+            <a:pPr lvl="1"/>
+            <a:r>
+              <a:rPr lang="en-US" dirty="0" smtClean="0"/>
+              <a:t>if variance over threshold, mark as number</a:t>
+            </a:r>
+            <a:endParaRPr lang="en-US" dirty="0"/>
+          </a:p>
+        </p:txBody>
+      </p:sp>
+      <p:pic>
+        <p:nvPicPr>
+          <p:cNvPr id="5" name="Picture 4" descr="blue_foundnumbers.jpg"/>
+          <p:cNvPicPr>
+            <a:picLocks noChangeAspect="1"/>
+          </p:cNvPicPr>
+          <p:nvPr/>
+        </p:nvPicPr>
+        <p:blipFill>
+          <a:blip r:embed="rId2">
+            <a:extLst>
+              <a:ext uri="{28A0092B-C50C-407E-A947-70E740481C1C}">
+                <a14:useLocalDpi xmlns:a14="http://schemas.microsoft.com/office/drawing/2010/main" val="0"/>
+              </a:ext>
+            </a:extLst>
+          </a:blip>
+          <a:stretch>
+            <a:fillRect/>
+          </a:stretch>
+        </p:blipFill>
+        <p:spPr>
+          <a:xfrm>
+            <a:off x="4859867" y="1825978"/>
+            <a:ext cx="3225800" cy="2844800"/>
+          </a:xfrm>
+          <a:prstGeom prst="rect">
+            <a:avLst/>
+          </a:prstGeom>
+        </p:spPr>
+      </p:pic>
+      <p:pic>
+        <p:nvPicPr>
+          <p:cNvPr id="6" name="Picture 5" descr="blue.jpg"/>
+          <p:cNvPicPr>
+            <a:picLocks noChangeAspect="1"/>
+          </p:cNvPicPr>
+          <p:nvPr/>
+        </p:nvPicPr>
+        <p:blipFill>
+          <a:blip r:embed="rId3">
+            <a:extLst>
+              <a:ext uri="{28A0092B-C50C-407E-A947-70E740481C1C}">
+                <a14:useLocalDpi xmlns:a14="http://schemas.microsoft.com/office/drawing/2010/main" val="0"/>
+              </a:ext>
+            </a:extLst>
+          </a:blip>
+          <a:stretch>
+            <a:fillRect/>
+          </a:stretch>
+        </p:blipFill>
+        <p:spPr>
+          <a:xfrm>
+            <a:off x="1072443" y="1825978"/>
+            <a:ext cx="3225800" cy="2844800"/>
+          </a:xfrm>
+          <a:prstGeom prst="rect">
+            <a:avLst/>
+          </a:prstGeom>
+        </p:spPr>
+      </p:pic>
     </p:spTree>
     <p:extLst>
       <p:ext uri="{BB962C8B-B14F-4D97-AF65-F5344CB8AC3E}">
@@ -4692,25 +5176,6 @@
       </p:grpSpPr>
       <p:sp>
         <p:nvSpPr>
-          <p:cNvPr id="2" name="Content Placeholder 1"/>
-          <p:cNvSpPr>
-            <a:spLocks noGrp="1"/>
-          </p:cNvSpPr>
-          <p:nvPr>
-            <p:ph idx="1"/>
-          </p:nvPr>
-        </p:nvSpPr>
-        <p:spPr/>
-        <p:txBody>
-          <a:bodyPr/>
-          <a:lstStyle/>
-          <a:p>
-            <a:endParaRPr lang="en-US"/>
-          </a:p>
-        </p:txBody>
-      </p:sp>
-      <p:sp>
-        <p:nvSpPr>
           <p:cNvPr id="3" name="Title 2"/>
           <p:cNvSpPr>
             <a:spLocks noGrp="1"/>
@@ -4732,6 +5197,290 @@
           </a:p>
         </p:txBody>
       </p:sp>
+      <p:sp>
+        <p:nvSpPr>
+          <p:cNvPr id="4" name="Content Placeholder 1"/>
+          <p:cNvSpPr>
+            <a:spLocks noGrp="1"/>
+          </p:cNvSpPr>
+          <p:nvPr>
+            <p:ph idx="1"/>
+          </p:nvPr>
+        </p:nvSpPr>
+        <p:spPr>
+          <a:xfrm>
+            <a:off x="380999" y="4814709"/>
+            <a:ext cx="8407893" cy="1537546"/>
+          </a:xfrm>
+        </p:spPr>
+        <p:txBody>
+          <a:bodyPr>
+            <a:normAutofit/>
+          </a:bodyPr>
+          <a:lstStyle/>
+          <a:p>
+            <a:r>
+              <a:rPr lang="en-US" dirty="0" smtClean="0"/>
+              <a:t>steps: </a:t>
+            </a:r>
+          </a:p>
+          <a:p>
+            <a:pPr lvl="1"/>
+            <a:r>
+              <a:rPr lang="en-US" dirty="0"/>
+              <a:t>for each “black” pixel, vote for lines</a:t>
+            </a:r>
+          </a:p>
+          <a:p>
+            <a:pPr lvl="1"/>
+            <a:r>
+              <a:rPr lang="en-US" dirty="0"/>
+              <a:t>pick most voted and rotate accordingly</a:t>
+            </a:r>
+            <a:endParaRPr lang="en-US" dirty="0"/>
+          </a:p>
+        </p:txBody>
+      </p:sp>
+      <p:pic>
+        <p:nvPicPr>
+          <p:cNvPr id="5" name="Picture 4" descr="blue_106_65_0.jpg"/>
+          <p:cNvPicPr>
+            <a:picLocks noChangeAspect="1"/>
+          </p:cNvPicPr>
+          <p:nvPr/>
+        </p:nvPicPr>
+        <p:blipFill>
+          <a:blip r:embed="rId2">
+            <a:extLst>
+              <a:ext uri="{28A0092B-C50C-407E-A947-70E740481C1C}">
+                <a14:useLocalDpi xmlns:a14="http://schemas.microsoft.com/office/drawing/2010/main" val="0"/>
+              </a:ext>
+            </a:extLst>
+          </a:blip>
+          <a:stretch>
+            <a:fillRect/>
+          </a:stretch>
+        </p:blipFill>
+        <p:spPr>
+          <a:xfrm>
+            <a:off x="4204404" y="1861256"/>
+            <a:ext cx="1006122" cy="1006122"/>
+          </a:xfrm>
+          <a:prstGeom prst="rect">
+            <a:avLst/>
+          </a:prstGeom>
+        </p:spPr>
+      </p:pic>
+      <p:pic>
+        <p:nvPicPr>
+          <p:cNvPr id="6" name="Picture 5" descr="blue_92_121_4.jpg"/>
+          <p:cNvPicPr>
+            <a:picLocks noChangeAspect="1"/>
+          </p:cNvPicPr>
+          <p:nvPr/>
+        </p:nvPicPr>
+        <p:blipFill>
+          <a:blip r:embed="rId3">
+            <a:extLst>
+              <a:ext uri="{28A0092B-C50C-407E-A947-70E740481C1C}">
+                <a14:useLocalDpi xmlns:a14="http://schemas.microsoft.com/office/drawing/2010/main" val="0"/>
+              </a:ext>
+            </a:extLst>
+          </a:blip>
+          <a:stretch>
+            <a:fillRect/>
+          </a:stretch>
+        </p:blipFill>
+        <p:spPr>
+          <a:xfrm>
+            <a:off x="3655484" y="3594805"/>
+            <a:ext cx="1006122" cy="1006122"/>
+          </a:xfrm>
+          <a:prstGeom prst="rect">
+            <a:avLst/>
+          </a:prstGeom>
+        </p:spPr>
+      </p:pic>
+      <p:pic>
+        <p:nvPicPr>
+          <p:cNvPr id="7" name="Picture 6" descr="blue5_199_66_10.jpg"/>
+          <p:cNvPicPr>
+            <a:picLocks noChangeAspect="1"/>
+          </p:cNvPicPr>
+          <p:nvPr/>
+        </p:nvPicPr>
+        <p:blipFill>
+          <a:blip r:embed="rId4">
+            <a:extLst>
+              <a:ext uri="{28A0092B-C50C-407E-A947-70E740481C1C}">
+                <a14:useLocalDpi xmlns:a14="http://schemas.microsoft.com/office/drawing/2010/main" val="0"/>
+              </a:ext>
+            </a:extLst>
+          </a:blip>
+          <a:stretch>
+            <a:fillRect/>
+          </a:stretch>
+        </p:blipFill>
+        <p:spPr>
+          <a:xfrm>
+            <a:off x="5436303" y="2997200"/>
+            <a:ext cx="1077987" cy="1006122"/>
+          </a:xfrm>
+          <a:prstGeom prst="rect">
+            <a:avLst/>
+          </a:prstGeom>
+        </p:spPr>
+      </p:pic>
+      <p:pic>
+        <p:nvPicPr>
+          <p:cNvPr id="8" name="Picture 7" descr="blue5_79_164_6.jpg"/>
+          <p:cNvPicPr>
+            <a:picLocks noChangeAspect="1"/>
+          </p:cNvPicPr>
+          <p:nvPr/>
+        </p:nvPicPr>
+        <p:blipFill>
+          <a:blip r:embed="rId5">
+            <a:extLst>
+              <a:ext uri="{28A0092B-C50C-407E-A947-70E740481C1C}">
+                <a14:useLocalDpi xmlns:a14="http://schemas.microsoft.com/office/drawing/2010/main" val="0"/>
+              </a:ext>
+            </a:extLst>
+          </a:blip>
+          <a:stretch>
+            <a:fillRect/>
+          </a:stretch>
+        </p:blipFill>
+        <p:spPr>
+          <a:xfrm>
+            <a:off x="2436385" y="2182989"/>
+            <a:ext cx="1077988" cy="1006122"/>
+          </a:xfrm>
+          <a:prstGeom prst="rect">
+            <a:avLst/>
+          </a:prstGeom>
+        </p:spPr>
+      </p:pic>
+      <p:pic>
+        <p:nvPicPr>
+          <p:cNvPr id="9" name="Picture 8" descr="blue4_176_50_1.jpg"/>
+          <p:cNvPicPr>
+            <a:picLocks noChangeAspect="1"/>
+          </p:cNvPicPr>
+          <p:nvPr/>
+        </p:nvPicPr>
+        <p:blipFill>
+          <a:blip r:embed="rId6">
+            <a:extLst>
+              <a:ext uri="{28A0092B-C50C-407E-A947-70E740481C1C}">
+                <a14:useLocalDpi xmlns:a14="http://schemas.microsoft.com/office/drawing/2010/main" val="0"/>
+              </a:ext>
+            </a:extLst>
+          </a:blip>
+          <a:stretch>
+            <a:fillRect/>
+          </a:stretch>
+        </p:blipFill>
+        <p:spPr>
+          <a:xfrm>
+            <a:off x="1308100" y="3397251"/>
+            <a:ext cx="1006122" cy="1006122"/>
+          </a:xfrm>
+          <a:prstGeom prst="rect">
+            <a:avLst/>
+          </a:prstGeom>
+        </p:spPr>
+      </p:pic>
+      <p:pic>
+        <p:nvPicPr>
+          <p:cNvPr id="10" name="Picture 9" descr="blue4_92_176_2.jpg"/>
+          <p:cNvPicPr>
+            <a:picLocks noChangeAspect="1"/>
+          </p:cNvPicPr>
+          <p:nvPr/>
+        </p:nvPicPr>
+        <p:blipFill>
+          <a:blip r:embed="rId7">
+            <a:extLst>
+              <a:ext uri="{28A0092B-C50C-407E-A947-70E740481C1C}">
+                <a14:useLocalDpi xmlns:a14="http://schemas.microsoft.com/office/drawing/2010/main" val="0"/>
+              </a:ext>
+            </a:extLst>
+          </a:blip>
+          <a:stretch>
+            <a:fillRect/>
+          </a:stretch>
+        </p:blipFill>
+        <p:spPr>
+          <a:xfrm>
+            <a:off x="6937727" y="2182989"/>
+            <a:ext cx="1006122" cy="1006122"/>
+          </a:xfrm>
+          <a:prstGeom prst="rect">
+            <a:avLst/>
+          </a:prstGeom>
+        </p:spPr>
+      </p:pic>
+      <p:pic>
+        <p:nvPicPr>
+          <p:cNvPr id="11" name="Picture 10" descr="blue3_214_66_8.jpg"/>
+          <p:cNvPicPr>
+            <a:picLocks noChangeAspect="1"/>
+          </p:cNvPicPr>
+          <p:nvPr/>
+        </p:nvPicPr>
+        <p:blipFill>
+          <a:blip r:embed="rId8">
+            <a:extLst>
+              <a:ext uri="{28A0092B-C50C-407E-A947-70E740481C1C}">
+                <a14:useLocalDpi xmlns:a14="http://schemas.microsoft.com/office/drawing/2010/main" val="0"/>
+              </a:ext>
+            </a:extLst>
+          </a:blip>
+          <a:stretch>
+            <a:fillRect/>
+          </a:stretch>
+        </p:blipFill>
+        <p:spPr>
+          <a:xfrm>
+            <a:off x="380999" y="1861256"/>
+            <a:ext cx="1147071" cy="994128"/>
+          </a:xfrm>
+          <a:prstGeom prst="rect">
+            <a:avLst/>
+          </a:prstGeom>
+        </p:spPr>
+      </p:pic>
+      <p:pic>
+        <p:nvPicPr>
+          <p:cNvPr id="12" name="Picture 11" descr="blue2_90_145_7.jpg"/>
+          <p:cNvPicPr>
+            <a:picLocks noChangeAspect="1"/>
+          </p:cNvPicPr>
+          <p:nvPr/>
+        </p:nvPicPr>
+        <p:blipFill>
+          <a:blip r:embed="rId9">
+            <a:extLst>
+              <a:ext uri="{28A0092B-C50C-407E-A947-70E740481C1C}">
+                <a14:useLocalDpi xmlns:a14="http://schemas.microsoft.com/office/drawing/2010/main" val="0"/>
+              </a:ext>
+            </a:extLst>
+          </a:blip>
+          <a:stretch>
+            <a:fillRect/>
+          </a:stretch>
+        </p:blipFill>
+        <p:spPr>
+          <a:xfrm>
+            <a:off x="7177852" y="3808587"/>
+            <a:ext cx="1173809" cy="1006122"/>
+          </a:xfrm>
+          <a:prstGeom prst="rect">
+            <a:avLst/>
+          </a:prstGeom>
+        </p:spPr>
+      </p:pic>
     </p:spTree>
     <p:extLst>
       <p:ext uri="{BB962C8B-B14F-4D97-AF65-F5344CB8AC3E}">
@@ -4764,25 +5513,6 @@
       </p:grpSpPr>
       <p:sp>
         <p:nvSpPr>
-          <p:cNvPr id="2" name="Content Placeholder 1"/>
-          <p:cNvSpPr>
-            <a:spLocks noGrp="1"/>
-          </p:cNvSpPr>
-          <p:nvPr>
-            <p:ph idx="1"/>
-          </p:nvPr>
-        </p:nvSpPr>
-        <p:spPr/>
-        <p:txBody>
-          <a:bodyPr/>
-          <a:lstStyle/>
-          <a:p>
-            <a:endParaRPr lang="en-US"/>
-          </a:p>
-        </p:txBody>
-      </p:sp>
-      <p:sp>
-        <p:nvSpPr>
           <p:cNvPr id="3" name="Title 2"/>
           <p:cNvSpPr>
             <a:spLocks noGrp="1"/>
@@ -4808,6 +5538,30 @@
           </a:p>
         </p:txBody>
       </p:sp>
+      <p:pic>
+        <p:nvPicPr>
+          <p:cNvPr id="5" name="Picture 4"/>
+          <p:cNvPicPr>
+            <a:picLocks noChangeAspect="1"/>
+          </p:cNvPicPr>
+          <p:nvPr/>
+        </p:nvPicPr>
+        <p:blipFill>
+          <a:blip r:embed="rId2"/>
+          <a:stretch>
+            <a:fillRect/>
+          </a:stretch>
+        </p:blipFill>
+        <p:spPr>
+          <a:xfrm>
+            <a:off x="2398888" y="2031999"/>
+            <a:ext cx="4346223" cy="4346223"/>
+          </a:xfrm>
+          <a:prstGeom prst="rect">
+            <a:avLst/>
+          </a:prstGeom>
+        </p:spPr>
+      </p:pic>
     </p:spTree>
     <p:extLst>
       <p:ext uri="{BB962C8B-B14F-4D97-AF65-F5344CB8AC3E}">

</xml_diff>